<commit_message>
saliency maps alexnet model 4
</commit_message>
<xml_diff>
--- a/Präsentation-Evaluierung.pptx
+++ b/Präsentation-Evaluierung.pptx
@@ -43,7 +43,8 @@
     <p:sldId id="294" r:id="rId37"/>
     <p:sldId id="296" r:id="rId38"/>
     <p:sldId id="291" r:id="rId39"/>
-    <p:sldId id="295" r:id="rId40"/>
+    <p:sldId id="297" r:id="rId40"/>
+    <p:sldId id="295" r:id="rId41"/>
   </p:sldIdLst>
   <p:sldSz cx="12192000" cy="6858000"/>
   <p:notesSz cx="6858000" cy="9144000"/>
@@ -8141,7 +8142,7 @@
           <p:cNvPr id="2" name="Titel 1">
             <a:extLst>
               <a:ext uri="{FF2B5EF4-FFF2-40B4-BE49-F238E27FC236}">
-                <a16:creationId xmlns:a16="http://schemas.microsoft.com/office/drawing/2014/main" id="{4FF9D76E-D7C9-182A-D815-2D462117AC3C}"/>
+                <a16:creationId xmlns:a16="http://schemas.microsoft.com/office/drawing/2014/main" id="{B2CB2E38-DB71-3F0F-B846-4C013A65F4DC}"/>
               </a:ext>
             </a:extLst>
           </p:cNvPr>
@@ -8157,10 +8158,7 @@
           <a:bodyPr/>
           <a:lstStyle/>
           <a:p>
-            <a:r>
-              <a:rPr lang="en-US" dirty="0"/>
-              <a:t>Zukunft</a:t>
-            </a:r>
+            <a:endParaRPr lang="en-US"/>
           </a:p>
         </p:txBody>
       </p:sp>
@@ -8169,121 +8167,71 @@
           <p:cNvPr id="3" name="Inhaltsplatzhalter 2">
             <a:extLst>
               <a:ext uri="{FF2B5EF4-FFF2-40B4-BE49-F238E27FC236}">
-                <a16:creationId xmlns:a16="http://schemas.microsoft.com/office/drawing/2014/main" id="{799F730A-7523-2312-A193-A86F52061BD3}"/>
-              </a:ext>
-            </a:extLst>
-          </p:cNvPr>
-          <p:cNvSpPr>
-            <a:spLocks noGrp="1"/>
-          </p:cNvSpPr>
-          <p:nvPr>
-            <p:ph idx="1"/>
-          </p:nvPr>
-        </p:nvSpPr>
-        <p:spPr/>
+                <a16:creationId xmlns:a16="http://schemas.microsoft.com/office/drawing/2014/main" id="{E0229677-1EEC-C15E-3EC4-F81BB5AD6F0B}"/>
+              </a:ext>
+            </a:extLst>
+          </p:cNvPr>
+          <p:cNvSpPr>
+            <a:spLocks noGrp="1"/>
+          </p:cNvSpPr>
+          <p:nvPr>
+            <p:ph sz="half" idx="1"/>
+          </p:nvPr>
+        </p:nvSpPr>
+        <p:spPr>
+          <a:xfrm>
+            <a:off x="838200" y="1825625"/>
+            <a:ext cx="3063949" cy="4351338"/>
+          </a:xfrm>
+        </p:spPr>
         <p:txBody>
           <a:bodyPr/>
           <a:lstStyle/>
           <a:p>
             <a:r>
               <a:rPr lang="en-US" dirty="0"/>
-              <a:t>Diffusion Model </a:t>
-            </a:r>
-            <a:r>
-              <a:rPr lang="en-US" dirty="0" err="1"/>
-              <a:t>verbessern</a:t>
-            </a:r>
-            <a:endParaRPr lang="en-US" dirty="0"/>
-          </a:p>
+              <a:t>1. 	</a:t>
+            </a:r>
+          </a:p>
+        </p:txBody>
+      </p:sp>
+      <p:sp>
+        <p:nvSpPr>
+          <p:cNvPr id="4" name="Inhaltsplatzhalter 3">
+            <a:extLst>
+              <a:ext uri="{FF2B5EF4-FFF2-40B4-BE49-F238E27FC236}">
+                <a16:creationId xmlns:a16="http://schemas.microsoft.com/office/drawing/2014/main" id="{768CD904-7D8A-DC4F-2FB0-889185F7FECD}"/>
+              </a:ext>
+            </a:extLst>
+          </p:cNvPr>
+          <p:cNvSpPr>
+            <a:spLocks noGrp="1"/>
+          </p:cNvSpPr>
+          <p:nvPr>
+            <p:ph sz="half" idx="2"/>
+          </p:nvPr>
+        </p:nvSpPr>
+        <p:spPr>
+          <a:xfrm>
+            <a:off x="4268972" y="1825625"/>
+            <a:ext cx="3063949" cy="4351338"/>
+          </a:xfrm>
+        </p:spPr>
+        <p:txBody>
+          <a:bodyPr/>
+          <a:lstStyle/>
           <a:p>
             <a:r>
               <a:rPr lang="en-US" dirty="0"/>
-              <a:t>Die </a:t>
-            </a:r>
-            <a:r>
-              <a:rPr lang="en-US" dirty="0" err="1"/>
-              <a:t>sehr</a:t>
-            </a:r>
-            <a:r>
-              <a:rPr lang="en-US" dirty="0"/>
-              <a:t> </a:t>
-            </a:r>
-            <a:r>
-              <a:rPr lang="en-US" dirty="0" err="1"/>
-              <a:t>änhlichen</a:t>
-            </a:r>
-            <a:r>
-              <a:rPr lang="en-US" dirty="0"/>
-              <a:t> </a:t>
-            </a:r>
-            <a:r>
-              <a:rPr lang="en-US" dirty="0" err="1"/>
-              <a:t>Buchstaben</a:t>
-            </a:r>
-            <a:r>
-              <a:rPr lang="en-US" dirty="0"/>
-              <a:t> </a:t>
-            </a:r>
-            <a:r>
-              <a:rPr lang="en-US" dirty="0" err="1"/>
-              <a:t>weitere</a:t>
-            </a:r>
-            <a:r>
-              <a:rPr lang="en-US" dirty="0"/>
-              <a:t> Bilder </a:t>
-            </a:r>
-            <a:r>
-              <a:rPr lang="en-US" dirty="0" err="1"/>
-              <a:t>hinzufügen</a:t>
-            </a:r>
-            <a:r>
-              <a:rPr lang="en-US" dirty="0"/>
-              <a:t> </a:t>
-            </a:r>
-            <a:r>
-              <a:rPr lang="en-US" dirty="0" err="1"/>
-              <a:t>bei</a:t>
-            </a:r>
-            <a:r>
-              <a:rPr lang="en-US" dirty="0"/>
-              <a:t> </a:t>
-            </a:r>
-            <a:r>
-              <a:rPr lang="en-US" dirty="0" err="1"/>
-              <a:t>denen</a:t>
-            </a:r>
-            <a:r>
-              <a:rPr lang="en-US" dirty="0"/>
-              <a:t> die </a:t>
-            </a:r>
-            <a:r>
-              <a:rPr lang="en-US" dirty="0" err="1"/>
-              <a:t>Unterschiede</a:t>
-            </a:r>
-            <a:r>
-              <a:rPr lang="en-US" dirty="0"/>
-              <a:t> </a:t>
-            </a:r>
-            <a:r>
-              <a:rPr lang="en-US" dirty="0" err="1"/>
-              <a:t>deutlicher</a:t>
-            </a:r>
-            <a:r>
-              <a:rPr lang="en-US" dirty="0"/>
-              <a:t> </a:t>
-            </a:r>
-            <a:r>
-              <a:rPr lang="en-US" dirty="0" err="1"/>
-              <a:t>werden</a:t>
-            </a:r>
-            <a:endParaRPr lang="en-US" dirty="0"/>
+              <a:t>2. </a:t>
+            </a:r>
           </a:p>
         </p:txBody>
       </p:sp>
     </p:spTree>
     <p:extLst>
       <p:ext uri="{BB962C8B-B14F-4D97-AF65-F5344CB8AC3E}">
-        <p14:creationId xmlns:p14="http://schemas.microsoft.com/office/powerpoint/2010/main" val="2141333207"/>
+        <p14:creationId xmlns:p14="http://schemas.microsoft.com/office/powerpoint/2010/main" val="2090827806"/>
       </p:ext>
     </p:extLst>
   </p:cSld>
@@ -8368,8 +8316,8 @@
         </p:blipFill>
         <p:spPr>
           <a:xfrm>
-            <a:off x="2091670" y="1553960"/>
-            <a:ext cx="6820762" cy="4774534"/>
+            <a:off x="1932180" y="1690688"/>
+            <a:ext cx="7594591" cy="5316215"/>
           </a:xfrm>
           <a:prstGeom prst="rect">
             <a:avLst/>
@@ -8380,6 +8328,180 @@
     <p:extLst>
       <p:ext uri="{BB962C8B-B14F-4D97-AF65-F5344CB8AC3E}">
         <p14:creationId xmlns:p14="http://schemas.microsoft.com/office/powerpoint/2010/main" val="1003666641"/>
+      </p:ext>
+    </p:extLst>
+  </p:cSld>
+  <p:clrMapOvr>
+    <a:masterClrMapping/>
+  </p:clrMapOvr>
+</p:sld>
+</file>
+
+<file path=ppt/slides/slide40.xml><?xml version="1.0" encoding="utf-8"?>
+<p:sld xmlns:a="http://schemas.openxmlformats.org/drawingml/2006/main" xmlns:r="http://schemas.openxmlformats.org/officeDocument/2006/relationships" xmlns:p="http://schemas.openxmlformats.org/presentationml/2006/main">
+  <p:cSld>
+    <p:spTree>
+      <p:nvGrpSpPr>
+        <p:cNvPr id="1" name=""/>
+        <p:cNvGrpSpPr/>
+        <p:nvPr/>
+      </p:nvGrpSpPr>
+      <p:grpSpPr>
+        <a:xfrm>
+          <a:off x="0" y="0"/>
+          <a:ext cx="0" cy="0"/>
+          <a:chOff x="0" y="0"/>
+          <a:chExt cx="0" cy="0"/>
+        </a:xfrm>
+      </p:grpSpPr>
+      <p:sp>
+        <p:nvSpPr>
+          <p:cNvPr id="2" name="Titel 1">
+            <a:extLst>
+              <a:ext uri="{FF2B5EF4-FFF2-40B4-BE49-F238E27FC236}">
+                <a16:creationId xmlns:a16="http://schemas.microsoft.com/office/drawing/2014/main" id="{4FF9D76E-D7C9-182A-D815-2D462117AC3C}"/>
+              </a:ext>
+            </a:extLst>
+          </p:cNvPr>
+          <p:cNvSpPr>
+            <a:spLocks noGrp="1"/>
+          </p:cNvSpPr>
+          <p:nvPr>
+            <p:ph type="title"/>
+          </p:nvPr>
+        </p:nvSpPr>
+        <p:spPr/>
+        <p:txBody>
+          <a:bodyPr/>
+          <a:lstStyle/>
+          <a:p>
+            <a:r>
+              <a:rPr lang="en-US" dirty="0"/>
+              <a:t>Zukunft</a:t>
+            </a:r>
+          </a:p>
+        </p:txBody>
+      </p:sp>
+      <p:sp>
+        <p:nvSpPr>
+          <p:cNvPr id="3" name="Inhaltsplatzhalter 2">
+            <a:extLst>
+              <a:ext uri="{FF2B5EF4-FFF2-40B4-BE49-F238E27FC236}">
+                <a16:creationId xmlns:a16="http://schemas.microsoft.com/office/drawing/2014/main" id="{799F730A-7523-2312-A193-A86F52061BD3}"/>
+              </a:ext>
+            </a:extLst>
+          </p:cNvPr>
+          <p:cNvSpPr>
+            <a:spLocks noGrp="1"/>
+          </p:cNvSpPr>
+          <p:nvPr>
+            <p:ph idx="1"/>
+          </p:nvPr>
+        </p:nvSpPr>
+        <p:spPr/>
+        <p:txBody>
+          <a:bodyPr/>
+          <a:lstStyle/>
+          <a:p>
+            <a:r>
+              <a:rPr lang="en-US" dirty="0"/>
+              <a:t>Diffusion Model </a:t>
+            </a:r>
+            <a:r>
+              <a:rPr lang="en-US" dirty="0" err="1"/>
+              <a:t>verbessern</a:t>
+            </a:r>
+            <a:endParaRPr lang="en-US" dirty="0"/>
+          </a:p>
+          <a:p>
+            <a:r>
+              <a:rPr lang="en-US" dirty="0"/>
+              <a:t>Die </a:t>
+            </a:r>
+            <a:r>
+              <a:rPr lang="en-US" dirty="0" err="1"/>
+              <a:t>sehr</a:t>
+            </a:r>
+            <a:r>
+              <a:rPr lang="en-US" dirty="0"/>
+              <a:t> </a:t>
+            </a:r>
+            <a:r>
+              <a:rPr lang="en-US" dirty="0" err="1"/>
+              <a:t>änhlichen</a:t>
+            </a:r>
+            <a:r>
+              <a:rPr lang="en-US" dirty="0"/>
+              <a:t> </a:t>
+            </a:r>
+            <a:r>
+              <a:rPr lang="en-US" dirty="0" err="1"/>
+              <a:t>Buchstaben</a:t>
+            </a:r>
+            <a:r>
+              <a:rPr lang="en-US" dirty="0"/>
+              <a:t> </a:t>
+            </a:r>
+            <a:r>
+              <a:rPr lang="en-US" dirty="0" err="1"/>
+              <a:t>weitere</a:t>
+            </a:r>
+            <a:r>
+              <a:rPr lang="en-US" dirty="0"/>
+              <a:t> Bilder </a:t>
+            </a:r>
+            <a:r>
+              <a:rPr lang="en-US" dirty="0" err="1"/>
+              <a:t>hinzufügen</a:t>
+            </a:r>
+            <a:r>
+              <a:rPr lang="en-US" dirty="0"/>
+              <a:t> </a:t>
+            </a:r>
+            <a:r>
+              <a:rPr lang="en-US" dirty="0" err="1"/>
+              <a:t>bei</a:t>
+            </a:r>
+            <a:r>
+              <a:rPr lang="en-US" dirty="0"/>
+              <a:t> </a:t>
+            </a:r>
+            <a:r>
+              <a:rPr lang="en-US" dirty="0" err="1"/>
+              <a:t>denen</a:t>
+            </a:r>
+            <a:r>
+              <a:rPr lang="en-US" dirty="0"/>
+              <a:t> die </a:t>
+            </a:r>
+            <a:r>
+              <a:rPr lang="en-US" dirty="0" err="1"/>
+              <a:t>Unterschiede</a:t>
+            </a:r>
+            <a:r>
+              <a:rPr lang="en-US" dirty="0"/>
+              <a:t> </a:t>
+            </a:r>
+            <a:r>
+              <a:rPr lang="en-US" dirty="0" err="1"/>
+              <a:t>deutlicher</a:t>
+            </a:r>
+            <a:r>
+              <a:rPr lang="en-US" dirty="0"/>
+              <a:t> </a:t>
+            </a:r>
+            <a:r>
+              <a:rPr lang="en-US" dirty="0" err="1"/>
+              <a:t>werden</a:t>
+            </a:r>
+            <a:endParaRPr lang="en-US" dirty="0"/>
+          </a:p>
+        </p:txBody>
+      </p:sp>
+    </p:spTree>
+    <p:extLst>
+      <p:ext uri="{BB962C8B-B14F-4D97-AF65-F5344CB8AC3E}">
+        <p14:creationId xmlns:p14="http://schemas.microsoft.com/office/powerpoint/2010/main" val="2141333207"/>
       </p:ext>
     </p:extLst>
   </p:cSld>

</xml_diff>